<commit_message>
Visual presentation that summarizes the work
</commit_message>
<xml_diff>
--- a/MRS Open Data Challenge - Fermi Surface Complexity Factor and Effective Mass.pptx
+++ b/MRS Open Data Challenge - Fermi Surface Complexity Factor and Effective Mass.pptx
@@ -275,7 +275,7 @@
               <a:rPr lang="en-US" smtClean="0">
                 <a:latin typeface="Arial" panose="020B0604020202020204" pitchFamily="34" charset="0"/>
               </a:rPr>
-              <a:t>2/28/2019</a:t>
+              <a:t>3/1/2019</a:t>
             </a:fld>
             <a:endParaRPr lang="en-US" dirty="0">
               <a:latin typeface="Arial" panose="020B0604020202020204" pitchFamily="34" charset="0"/>
@@ -454,7 +454,7 @@
             <a:fld id="{697F5787-4636-46B4-9F75-BD9318F6EA37}" type="datetimeFigureOut">
               <a:rPr lang="en-GB" smtClean="0"/>
               <a:pPr/>
-              <a:t>28/02/2019</a:t>
+              <a:t>01/03/2019</a:t>
             </a:fld>
             <a:endParaRPr lang="en-GB" dirty="0"/>
           </a:p>
@@ -3057,7 +3057,7 @@
           <a:p>
             <a:fld id="{4699DB36-65B6-4735-B879-624B656A1F03}" type="datetimeFigureOut">
               <a:rPr lang="en-US" smtClean="0"/>
-              <a:t>2/28/2019</a:t>
+              <a:t>3/1/2019</a:t>
             </a:fld>
             <a:endParaRPr lang="en-US"/>
           </a:p>
@@ -3273,7 +3273,7 @@
           <a:p>
             <a:fld id="{BC79DA9F-5273-4AFF-B670-58CA7D389E96}" type="datetimeFigureOut">
               <a:rPr lang="en-US" smtClean="0"/>
-              <a:t>2/28/2019</a:t>
+              <a:t>3/1/2019</a:t>
             </a:fld>
             <a:endParaRPr lang="en-US"/>
           </a:p>
@@ -4077,7 +4077,15 @@
             </a:r>
             <a:r>
               <a:rPr lang="en-US" dirty="0"/>
-              <a:t>, we reveal the crucial role of effective mass on electronic transport. We propose that in low inertial effective mass material, any changes in crystal symmetry, band alignment, or doping </a:t>
+              <a:t>, we reveal the crucial role of effective mass on electronic transport. We propose that in low inertial effective mass </a:t>
+            </a:r>
+            <a:r>
+              <a:rPr lang="en-US" dirty="0" smtClean="0"/>
+              <a:t>materials, </a:t>
+            </a:r>
+            <a:r>
+              <a:rPr lang="en-US" dirty="0"/>
+              <a:t>any changes in crystal symmetry, band alignment, or doping </a:t>
             </a:r>
             <a:r>
               <a:rPr lang="en-US" dirty="0" smtClean="0"/>
@@ -4089,13 +4097,20 @@
             </a:r>
             <a:r>
               <a:rPr lang="en-US" dirty="0" smtClean="0"/>
-              <a:t>the material’s thermoelectric </a:t>
+              <a:t>the </a:t>
+            </a:r>
+            <a:r>
+              <a:rPr lang="en-US" dirty="0" smtClean="0"/>
+              <a:t>material’s </a:t>
+            </a:r>
+            <a:r>
+              <a:rPr lang="en-US" dirty="0" smtClean="0"/>
+              <a:t>thermoelectric </a:t>
             </a:r>
             <a:r>
               <a:rPr lang="en-US" dirty="0"/>
               <a:t>power factor</a:t>
             </a:r>
-            <a:endParaRPr lang="en-US" dirty="0"/>
           </a:p>
         </p:txBody>
       </p:sp>
@@ -4800,7 +4815,21 @@
                       <a:latin typeface="Times New Roman" panose="02020603050405020304" pitchFamily="18" charset="0"/>
                       <a:cs typeface="Times New Roman" panose="02020603050405020304" pitchFamily="18" charset="0"/>
                     </a:rPr>
-                    <a:t>Thermoelectric materials are  characterized by figure of merit, </a:t>
+                    <a:t>Thermoelectric materials are </a:t>
+                  </a:r>
+                  <a:r>
+                    <a:rPr lang="en-US" sz="2000" dirty="0" smtClean="0">
+                      <a:latin typeface="Times New Roman" panose="02020603050405020304" pitchFamily="18" charset="0"/>
+                      <a:cs typeface="Times New Roman" panose="02020603050405020304" pitchFamily="18" charset="0"/>
+                    </a:rPr>
+                    <a:t>characterized </a:t>
+                  </a:r>
+                  <a:r>
+                    <a:rPr lang="en-US" sz="2000" dirty="0" smtClean="0">
+                      <a:latin typeface="Times New Roman" panose="02020603050405020304" pitchFamily="18" charset="0"/>
+                      <a:cs typeface="Times New Roman" panose="02020603050405020304" pitchFamily="18" charset="0"/>
+                    </a:rPr>
+                    <a:t>by figure of merit, </a:t>
                   </a:r>
                   <a14:m>
                     <m:oMath xmlns:m="http://schemas.openxmlformats.org/officeDocument/2006/math">
@@ -4878,57 +4907,79 @@
                       </m:oMathParaPr>
                       <m:oMath xmlns:m="http://schemas.openxmlformats.org/officeDocument/2006/math">
                         <m:r>
-                          <a:rPr lang="en-US" i="1"/>
+                          <a:rPr lang="en-US" i="1">
+                            <a:latin typeface="Cambria Math" panose="02040503050406030204" pitchFamily="18" charset="0"/>
+                          </a:rPr>
                           <m:t>𝜎</m:t>
                         </m:r>
                         <m:r>
-                          <a:rPr lang="en-US" i="1"/>
+                          <a:rPr lang="en-US" i="1">
+                            <a:latin typeface="Cambria Math" panose="02040503050406030204" pitchFamily="18" charset="0"/>
+                          </a:rPr>
                           <m:t>= </m:t>
                         </m:r>
                         <m:r>
-                          <a:rPr lang="en-US" i="1"/>
+                          <a:rPr lang="en-US" i="1">
+                            <a:latin typeface="Cambria Math" panose="02040503050406030204" pitchFamily="18" charset="0"/>
+                          </a:rPr>
                           <m:t>𝑛𝑒</m:t>
                         </m:r>
                         <m:r>
-                          <a:rPr lang="en-US" i="1"/>
+                          <a:rPr lang="en-US" i="1">
+                            <a:latin typeface="Cambria Math" panose="02040503050406030204" pitchFamily="18" charset="0"/>
+                          </a:rPr>
                           <m:t>𝜇</m:t>
                         </m:r>
                         <m:r>
-                          <a:rPr lang="en-US" i="1"/>
+                          <a:rPr lang="en-US" i="1">
+                            <a:latin typeface="Cambria Math" panose="02040503050406030204" pitchFamily="18" charset="0"/>
+                          </a:rPr>
                           <m:t>=</m:t>
                         </m:r>
                         <m:f>
                           <m:fPr>
                             <m:ctrlPr>
-                              <a:rPr lang="en-US" i="1"/>
+                              <a:rPr lang="en-US" i="1">
+                                <a:latin typeface="Cambria Math" panose="02040503050406030204" pitchFamily="18" charset="0"/>
+                              </a:rPr>
                             </m:ctrlPr>
                           </m:fPr>
                           <m:num>
                             <m:r>
-                              <a:rPr lang="en-US" i="1"/>
+                              <a:rPr lang="en-US" i="1">
+                                <a:latin typeface="Cambria Math" panose="02040503050406030204" pitchFamily="18" charset="0"/>
+                              </a:rPr>
                               <m:t>𝑛</m:t>
                             </m:r>
                             <m:sSup>
                               <m:sSupPr>
                                 <m:ctrlPr>
-                                  <a:rPr lang="en-US" i="1"/>
+                                  <a:rPr lang="en-US" i="1">
+                                    <a:latin typeface="Cambria Math" panose="02040503050406030204" pitchFamily="18" charset="0"/>
+                                  </a:rPr>
                                 </m:ctrlPr>
                               </m:sSupPr>
                               <m:e>
                                 <m:r>
-                                  <a:rPr lang="en-US" i="1"/>
+                                  <a:rPr lang="en-US" i="1">
+                                    <a:latin typeface="Cambria Math" panose="02040503050406030204" pitchFamily="18" charset="0"/>
+                                  </a:rPr>
                                   <m:t>𝑒</m:t>
                                 </m:r>
                               </m:e>
                               <m:sup>
                                 <m:r>
-                                  <a:rPr lang="en-US" i="1"/>
+                                  <a:rPr lang="en-US" i="1">
+                                    <a:latin typeface="Cambria Math" panose="02040503050406030204" pitchFamily="18" charset="0"/>
+                                  </a:rPr>
                                   <m:t>2</m:t>
                                 </m:r>
                               </m:sup>
                             </m:sSup>
                             <m:r>
-                              <a:rPr lang="en-US" i="1"/>
+                              <a:rPr lang="en-US" i="1">
+                                <a:latin typeface="Cambria Math" panose="02040503050406030204" pitchFamily="18" charset="0"/>
+                              </a:rPr>
                               <m:t>𝜏</m:t>
                             </m:r>
                           </m:num>
@@ -5101,7 +5152,7 @@
                 <a:blipFill>
                   <a:blip r:embed="rId2"/>
                   <a:stretch>
-                    <a:fillRect l="-704" t="-776" b="-1423"/>
+                    <a:fillRect l="-704" t="-776" b="-1294"/>
                   </a:stretch>
                 </a:blipFill>
               </p:spPr>
@@ -5194,8 +5245,8 @@
             </a:p>
           </p:txBody>
         </p:sp>
-        <mc:AlternateContent xmlns:mc="http://schemas.openxmlformats.org/markup-compatibility/2006">
-          <mc:Choice xmlns:a14="http://schemas.microsoft.com/office/drawing/2010/main" Requires="a14">
+        <mc:AlternateContent xmlns:mc="http://schemas.openxmlformats.org/markup-compatibility/2006" xmlns:a14="http://schemas.microsoft.com/office/drawing/2010/main">
+          <mc:Choice Requires="a14">
             <p:sp>
               <p:nvSpPr>
                 <p:cNvPr id="3" name="TextBox 2"/>
@@ -5218,6 +5269,7 @@
                 </a:bodyPr>
                 <a:lstStyle/>
                 <a:p>
+                  <a:pPr/>
                   <a14:m>
                     <m:oMathPara xmlns:m="http://schemas.openxmlformats.org/officeDocument/2006/math">
                       <m:oMathParaPr>
@@ -5314,7 +5366,7 @@
               </p:txBody>
             </p:sp>
           </mc:Choice>
-          <mc:Fallback>
+          <mc:Fallback xmlns="">
             <p:sp>
               <p:nvSpPr>
                 <p:cNvPr id="3" name="TextBox 2"/>
@@ -5354,8 +5406,8 @@
           </mc:Fallback>
         </mc:AlternateContent>
       </p:grpSp>
-      <mc:AlternateContent xmlns:mc="http://schemas.openxmlformats.org/markup-compatibility/2006">
-        <mc:Choice xmlns:a14="http://schemas.microsoft.com/office/drawing/2010/main" Requires="a14">
+      <mc:AlternateContent xmlns:mc="http://schemas.openxmlformats.org/markup-compatibility/2006" xmlns:a14="http://schemas.microsoft.com/office/drawing/2010/main">
+        <mc:Choice Requires="a14">
           <p:sp>
             <p:nvSpPr>
               <p:cNvPr id="5" name="TextBox 4"/>
@@ -5448,7 +5500,7 @@
             </p:txBody>
           </p:sp>
         </mc:Choice>
-        <mc:Fallback>
+        <mc:Fallback xmlns="">
           <p:sp>
             <p:nvSpPr>
               <p:cNvPr id="5" name="TextBox 4"/>
@@ -5560,8 +5612,8 @@
           </a:p>
         </p:txBody>
       </p:sp>
-      <mc:AlternateContent xmlns:mc="http://schemas.openxmlformats.org/markup-compatibility/2006">
-        <mc:Choice xmlns:a14="http://schemas.microsoft.com/office/drawing/2010/main" Requires="a14">
+      <mc:AlternateContent xmlns:mc="http://schemas.openxmlformats.org/markup-compatibility/2006" xmlns:a14="http://schemas.microsoft.com/office/drawing/2010/main">
+        <mc:Choice Requires="a14">
           <p:sp>
             <p:nvSpPr>
               <p:cNvPr id="7" name="TextBox 6"/>
@@ -5808,14 +5860,7 @@
                     <a:latin typeface="Times New Roman" panose="02020603050405020304" pitchFamily="18" charset="0"/>
                     <a:cs typeface="Times New Roman" panose="02020603050405020304" pitchFamily="18" charset="0"/>
                   </a:rPr>
-                  <a:t>), called the thermoelectric power </a:t>
-                </a:r>
-                <a:r>
-                  <a:rPr lang="en-US" sz="2000" dirty="0" smtClean="0">
-                    <a:latin typeface="Times New Roman" panose="02020603050405020304" pitchFamily="18" charset="0"/>
-                    <a:cs typeface="Times New Roman" panose="02020603050405020304" pitchFamily="18" charset="0"/>
-                  </a:rPr>
-                  <a:t>factor (PF).</a:t>
+                  <a:t>), called the thermoelectric power factor (PF).</a:t>
                 </a:r>
               </a:p>
               <a:p>
@@ -6167,7 +6212,7 @@
             </p:txBody>
           </p:sp>
         </mc:Choice>
-        <mc:Fallback>
+        <mc:Fallback xmlns="">
           <p:sp>
             <p:nvSpPr>
               <p:cNvPr id="7" name="TextBox 6"/>
@@ -6206,8 +6251,8 @@
           </p:sp>
         </mc:Fallback>
       </mc:AlternateContent>
-      <mc:AlternateContent xmlns:mc="http://schemas.openxmlformats.org/markup-compatibility/2006">
-        <mc:Choice xmlns:a14="http://schemas.microsoft.com/office/drawing/2010/main" Requires="a14">
+      <mc:AlternateContent xmlns:mc="http://schemas.openxmlformats.org/markup-compatibility/2006" xmlns:a14="http://schemas.microsoft.com/office/drawing/2010/main">
+        <mc:Choice Requires="a14">
           <p:sp>
             <p:nvSpPr>
               <p:cNvPr id="2" name="TextBox 1"/>
@@ -6235,14 +6280,7 @@
                     <a:latin typeface="Times New Roman" panose="02020603050405020304" pitchFamily="18" charset="0"/>
                     <a:cs typeface="Times New Roman" panose="02020603050405020304" pitchFamily="18" charset="0"/>
                   </a:rPr>
-                  <a:t>S </a:t>
-                </a:r>
-                <a:r>
-                  <a:rPr lang="en-US" sz="2000" dirty="0">
-                    <a:latin typeface="Times New Roman" panose="02020603050405020304" pitchFamily="18" charset="0"/>
-                    <a:cs typeface="Times New Roman" panose="02020603050405020304" pitchFamily="18" charset="0"/>
-                  </a:rPr>
-                  <a:t>= </a:t>
+                  <a:t>S = </a:t>
                 </a:r>
                 <a14:m>
                   <m:oMath xmlns:m="http://schemas.openxmlformats.org/officeDocument/2006/math">
@@ -6499,7 +6537,7 @@
             </p:txBody>
           </p:sp>
         </mc:Choice>
-        <mc:Fallback>
+        <mc:Fallback xmlns="">
           <p:sp>
             <p:nvSpPr>
               <p:cNvPr id="2" name="TextBox 1"/>
@@ -6538,8 +6576,8 @@
           </p:sp>
         </mc:Fallback>
       </mc:AlternateContent>
-      <mc:AlternateContent xmlns:mc="http://schemas.openxmlformats.org/markup-compatibility/2006">
-        <mc:Choice xmlns:a14="http://schemas.microsoft.com/office/drawing/2010/main" Requires="a14">
+      <mc:AlternateContent xmlns:mc="http://schemas.openxmlformats.org/markup-compatibility/2006" xmlns:a14="http://schemas.microsoft.com/office/drawing/2010/main">
+        <mc:Choice Requires="a14">
           <p:sp>
             <p:nvSpPr>
               <p:cNvPr id="3" name="TextBox 2"/>
@@ -6622,7 +6660,7 @@
             </p:txBody>
           </p:sp>
         </mc:Choice>
-        <mc:Fallback>
+        <mc:Fallback xmlns="">
           <p:sp>
             <p:nvSpPr>
               <p:cNvPr id="3" name="TextBox 2"/>
@@ -6661,8 +6699,8 @@
           </p:sp>
         </mc:Fallback>
       </mc:AlternateContent>
-      <mc:AlternateContent xmlns:mc="http://schemas.openxmlformats.org/markup-compatibility/2006">
-        <mc:Choice xmlns:a14="http://schemas.microsoft.com/office/drawing/2010/main" Requires="a14">
+      <mc:AlternateContent xmlns:mc="http://schemas.openxmlformats.org/markup-compatibility/2006" xmlns:a14="http://schemas.microsoft.com/office/drawing/2010/main">
+        <mc:Choice Requires="a14">
           <p:sp>
             <p:nvSpPr>
               <p:cNvPr id="4" name="TextBox 3"/>
@@ -6783,21 +6821,7 @@
                     <a:latin typeface="Times New Roman" panose="02020603050405020304" pitchFamily="18" charset="0"/>
                     <a:cs typeface="Times New Roman" panose="02020603050405020304" pitchFamily="18" charset="0"/>
                   </a:rPr>
-                  <a:t> represents </a:t>
-                </a:r>
-                <a:r>
-                  <a:rPr lang="en-US" dirty="0">
-                    <a:latin typeface="Times New Roman" panose="02020603050405020304" pitchFamily="18" charset="0"/>
-                    <a:cs typeface="Times New Roman" panose="02020603050405020304" pitchFamily="18" charset="0"/>
-                  </a:rPr>
-                  <a:t>the band structure </a:t>
-                </a:r>
-                <a:r>
-                  <a:rPr lang="en-US" dirty="0">
-                    <a:latin typeface="Times New Roman" panose="02020603050405020304" pitchFamily="18" charset="0"/>
-                    <a:cs typeface="Times New Roman" panose="02020603050405020304" pitchFamily="18" charset="0"/>
-                  </a:rPr>
-                  <a:t>anisotropy</a:t>
+                  <a:t> represents the band structure anisotropy</a:t>
                 </a:r>
                 <a:r>
                   <a:rPr lang="en-US" dirty="0" smtClean="0">
@@ -6814,7 +6838,7 @@
             </p:txBody>
           </p:sp>
         </mc:Choice>
-        <mc:Fallback>
+        <mc:Fallback xmlns="">
           <p:sp>
             <p:nvSpPr>
               <p:cNvPr id="4" name="TextBox 3"/>
@@ -7010,28 +7034,7 @@
                     <a:latin typeface="Times New Roman" panose="02020603050405020304" pitchFamily="18" charset="0"/>
                     <a:cs typeface="Times New Roman" panose="02020603050405020304" pitchFamily="18" charset="0"/>
                   </a:rPr>
-                  <a:t> is </a:t>
-                </a:r>
-                <a:r>
-                  <a:rPr lang="en-US" sz="2000" dirty="0" smtClean="0">
-                    <a:latin typeface="Times New Roman" panose="02020603050405020304" pitchFamily="18" charset="0"/>
-                    <a:cs typeface="Times New Roman" panose="02020603050405020304" pitchFamily="18" charset="0"/>
-                  </a:rPr>
-                  <a:t>independent of </a:t>
-                </a:r>
-                <a:r>
-                  <a:rPr lang="en-US" sz="2000" dirty="0" smtClean="0">
-                    <a:latin typeface="Times New Roman" panose="02020603050405020304" pitchFamily="18" charset="0"/>
-                    <a:cs typeface="Times New Roman" panose="02020603050405020304" pitchFamily="18" charset="0"/>
-                  </a:rPr>
-                  <a:t>carrier concentration</a:t>
-                </a:r>
-                <a:r>
-                  <a:rPr lang="en-US" sz="2000" dirty="0" smtClean="0">
-                    <a:latin typeface="Times New Roman" panose="02020603050405020304" pitchFamily="18" charset="0"/>
-                    <a:cs typeface="Times New Roman" panose="02020603050405020304" pitchFamily="18" charset="0"/>
-                  </a:rPr>
-                  <a:t> </a:t>
+                  <a:t> is independent of carrier concentration </a:t>
                 </a:r>
                 <a:br>
                   <a:rPr lang="en-US" sz="2000" dirty="0" smtClean="0">
@@ -7213,21 +7216,7 @@
                     <a:latin typeface="Times New Roman" panose="02020603050405020304" pitchFamily="18" charset="0"/>
                     <a:cs typeface="Times New Roman" panose="02020603050405020304" pitchFamily="18" charset="0"/>
                   </a:rPr>
-                  <a:t>coustic </a:t>
-                </a:r>
-                <a:r>
-                  <a:rPr lang="en-US" sz="2000" dirty="0" smtClean="0">
-                    <a:latin typeface="Times New Roman" panose="02020603050405020304" pitchFamily="18" charset="0"/>
-                    <a:cs typeface="Times New Roman" panose="02020603050405020304" pitchFamily="18" charset="0"/>
-                  </a:rPr>
-                  <a:t>phonon </a:t>
-                </a:r>
-                <a:r>
-                  <a:rPr lang="en-US" sz="2000" dirty="0" smtClean="0">
-                    <a:latin typeface="Times New Roman" panose="02020603050405020304" pitchFamily="18" charset="0"/>
-                    <a:cs typeface="Times New Roman" panose="02020603050405020304" pitchFamily="18" charset="0"/>
-                  </a:rPr>
-                  <a:t>scattering;</a:t>
+                  <a:t>coustic phonon scattering;</a:t>
                 </a:r>
               </a:p>
               <a:p>
@@ -7257,7 +7246,14 @@
                     <a:latin typeface="Times New Roman" panose="02020603050405020304" pitchFamily="18" charset="0"/>
                     <a:cs typeface="Times New Roman" panose="02020603050405020304" pitchFamily="18" charset="0"/>
                   </a:rPr>
-                  <a:t> and inertia effective masses are obtained from effective mass averaging method (Singh, Slack</a:t>
+                  <a:t> and inertia effective masses are obtained from effective mass averaging method (</a:t>
+                </a:r>
+                <a:r>
+                  <a:rPr lang="en-US" sz="2000" i="1" dirty="0">
+                    <a:latin typeface="Times New Roman" panose="02020603050405020304" pitchFamily="18" charset="0"/>
+                    <a:cs typeface="Times New Roman" panose="02020603050405020304" pitchFamily="18" charset="0"/>
+                  </a:rPr>
+                  <a:t>Singh, Slack</a:t>
                 </a:r>
                 <a:r>
                   <a:rPr lang="en-US" sz="2000" dirty="0" smtClean="0">
@@ -7350,8 +7346,8 @@
           <a:chExt cx="0" cy="0"/>
         </a:xfrm>
       </p:grpSpPr>
-      <mc:AlternateContent xmlns:mc="http://schemas.openxmlformats.org/markup-compatibility/2006">
-        <mc:Choice xmlns:a14="http://schemas.microsoft.com/office/drawing/2010/main" Requires="a14">
+      <mc:AlternateContent xmlns:mc="http://schemas.openxmlformats.org/markup-compatibility/2006" xmlns:a14="http://schemas.microsoft.com/office/drawing/2010/main">
+        <mc:Choice Requires="a14">
           <p:sp>
             <p:nvSpPr>
               <p:cNvPr id="2" name="Content Placeholder 1"/>
@@ -7871,7 +7867,7 @@
             </p:txBody>
           </p:sp>
         </mc:Choice>
-        <mc:Fallback>
+        <mc:Fallback xmlns="">
           <p:sp>
             <p:nvSpPr>
               <p:cNvPr id="2" name="Content Placeholder 1"/>
@@ -7963,8 +7959,8 @@
           </a:p>
         </p:txBody>
       </p:sp>
-      <mc:AlternateContent xmlns:mc="http://schemas.openxmlformats.org/markup-compatibility/2006">
-        <mc:Choice xmlns:a14="http://schemas.microsoft.com/office/drawing/2010/main" Requires="a14">
+      <mc:AlternateContent xmlns:mc="http://schemas.openxmlformats.org/markup-compatibility/2006" xmlns:a14="http://schemas.microsoft.com/office/drawing/2010/main">
+        <mc:Choice Requires="a14">
           <p:sp>
             <p:nvSpPr>
               <p:cNvPr id="7" name="TextBox 6"/>
@@ -8466,7 +8462,7 @@
             </p:txBody>
           </p:sp>
         </mc:Choice>
-        <mc:Fallback>
+        <mc:Fallback xmlns="">
           <p:sp>
             <p:nvSpPr>
               <p:cNvPr id="7" name="TextBox 6"/>
@@ -8515,6 +8511,13 @@
   <p:clrMapOvr>
     <a:masterClrMapping/>
   </p:clrMapOvr>
+  <p:timing>
+    <p:tnLst>
+      <p:par>
+        <p:cTn id="1" dur="indefinite" restart="never" nodeType="tmRoot"/>
+      </p:par>
+    </p:tnLst>
+  </p:timing>
 </p:sld>
 </file>
 
@@ -8535,8 +8538,8 @@
           <a:chExt cx="0" cy="0"/>
         </a:xfrm>
       </p:grpSpPr>
-      <mc:AlternateContent xmlns:mc="http://schemas.openxmlformats.org/markup-compatibility/2006">
-        <mc:Choice xmlns:a14="http://schemas.microsoft.com/office/drawing/2010/main" Requires="a14">
+      <mc:AlternateContent xmlns:mc="http://schemas.openxmlformats.org/markup-compatibility/2006" xmlns:a14="http://schemas.microsoft.com/office/drawing/2010/main">
+        <mc:Choice Requires="a14">
           <p:sp>
             <p:nvSpPr>
               <p:cNvPr id="4" name="Rectangle 3"/>
@@ -8796,7 +8799,7 @@
             </p:txBody>
           </p:sp>
         </mc:Choice>
-        <mc:Fallback>
+        <mc:Fallback xmlns="">
           <p:sp>
             <p:nvSpPr>
               <p:cNvPr id="4" name="Rectangle 3"/>
@@ -9032,7 +9035,63 @@
                     <a:latin typeface="Times New Roman" panose="02020603050405020304" pitchFamily="18" charset="0"/>
                     <a:cs typeface="Times New Roman" panose="02020603050405020304" pitchFamily="18" charset="0"/>
                   </a:rPr>
-                  <a:t> for 1617 n type and p type compounds, confirming the importance of low </a:t>
+                  <a:t> for 1617 </a:t>
+                </a:r>
+                <a:r>
+                  <a:rPr lang="en-US" dirty="0" smtClean="0">
+                    <a:latin typeface="Times New Roman" panose="02020603050405020304" pitchFamily="18" charset="0"/>
+                    <a:cs typeface="Times New Roman" panose="02020603050405020304" pitchFamily="18" charset="0"/>
+                  </a:rPr>
+                  <a:t>n</a:t>
+                </a:r>
+                <a:r>
+                  <a:rPr lang="uk-UA" dirty="0" smtClean="0">
+                    <a:latin typeface="Times New Roman" panose="02020603050405020304" pitchFamily="18" charset="0"/>
+                    <a:cs typeface="Times New Roman" panose="02020603050405020304" pitchFamily="18" charset="0"/>
+                  </a:rPr>
+                  <a:t>-</a:t>
+                </a:r>
+                <a:r>
+                  <a:rPr lang="en-US" dirty="0" smtClean="0">
+                    <a:latin typeface="Times New Roman" panose="02020603050405020304" pitchFamily="18" charset="0"/>
+                    <a:cs typeface="Times New Roman" panose="02020603050405020304" pitchFamily="18" charset="0"/>
+                  </a:rPr>
+                  <a:t>type </a:t>
+                </a:r>
+                <a:r>
+                  <a:rPr lang="en-US" dirty="0" smtClean="0">
+                    <a:latin typeface="Times New Roman" panose="02020603050405020304" pitchFamily="18" charset="0"/>
+                    <a:cs typeface="Times New Roman" panose="02020603050405020304" pitchFamily="18" charset="0"/>
+                  </a:rPr>
+                  <a:t>and </a:t>
+                </a:r>
+                <a:r>
+                  <a:rPr lang="en-US" dirty="0" smtClean="0">
+                    <a:latin typeface="Times New Roman" panose="02020603050405020304" pitchFamily="18" charset="0"/>
+                    <a:cs typeface="Times New Roman" panose="02020603050405020304" pitchFamily="18" charset="0"/>
+                  </a:rPr>
+                  <a:t>p</a:t>
+                </a:r>
+                <a:r>
+                  <a:rPr lang="uk-UA" dirty="0" smtClean="0">
+                    <a:latin typeface="Times New Roman" panose="02020603050405020304" pitchFamily="18" charset="0"/>
+                    <a:cs typeface="Times New Roman" panose="02020603050405020304" pitchFamily="18" charset="0"/>
+                  </a:rPr>
+                  <a:t>-</a:t>
+                </a:r>
+                <a:r>
+                  <a:rPr lang="en-US" dirty="0" smtClean="0">
+                    <a:latin typeface="Times New Roman" panose="02020603050405020304" pitchFamily="18" charset="0"/>
+                    <a:cs typeface="Times New Roman" panose="02020603050405020304" pitchFamily="18" charset="0"/>
+                  </a:rPr>
+                  <a:t>type </a:t>
+                </a:r>
+                <a:r>
+                  <a:rPr lang="en-US" dirty="0" smtClean="0">
+                    <a:latin typeface="Times New Roman" panose="02020603050405020304" pitchFamily="18" charset="0"/>
+                    <a:cs typeface="Times New Roman" panose="02020603050405020304" pitchFamily="18" charset="0"/>
+                  </a:rPr>
+                  <a:t>compounds, confirming the importance of low </a:t>
                 </a:r>
                 <a14:m>
                   <m:oMath xmlns:m="http://schemas.openxmlformats.org/officeDocument/2006/math">
@@ -9479,8 +9538,8 @@
           <a:chExt cx="0" cy="0"/>
         </a:xfrm>
       </p:grpSpPr>
-      <mc:AlternateContent xmlns:mc="http://schemas.openxmlformats.org/markup-compatibility/2006">
-        <mc:Choice xmlns:a14="http://schemas.microsoft.com/office/drawing/2010/main" Requires="a14">
+      <mc:AlternateContent xmlns:mc="http://schemas.openxmlformats.org/markup-compatibility/2006" xmlns:a14="http://schemas.microsoft.com/office/drawing/2010/main">
+        <mc:Choice Requires="a14">
           <p:sp>
             <p:nvSpPr>
               <p:cNvPr id="46" name="Rectangle 45"/>
@@ -9793,7 +9852,7 @@
             </p:txBody>
           </p:sp>
         </mc:Choice>
-        <mc:Fallback>
+        <mc:Fallback xmlns="">
           <p:sp>
             <p:nvSpPr>
               <p:cNvPr id="46" name="Rectangle 45"/>
@@ -9856,8 +9915,8 @@
           </a:prstGeom>
         </p:spPr>
       </p:pic>
-      <mc:AlternateContent xmlns:mc="http://schemas.openxmlformats.org/markup-compatibility/2006">
-        <mc:Choice xmlns:a14="http://schemas.microsoft.com/office/drawing/2010/main" Requires="a14">
+      <mc:AlternateContent xmlns:mc="http://schemas.openxmlformats.org/markup-compatibility/2006" xmlns:a14="http://schemas.microsoft.com/office/drawing/2010/main">
+        <mc:Choice Requires="a14">
           <p:sp>
             <p:nvSpPr>
               <p:cNvPr id="4" name="TextBox 3"/>
@@ -10129,15 +10188,11 @@
                   </a:rPr>
                   <a:t> region. </a:t>
                 </a:r>
-                <a:endParaRPr lang="en-US" dirty="0">
-                  <a:latin typeface="Times New Roman" panose="02020603050405020304" pitchFamily="18" charset="0"/>
-                  <a:cs typeface="Times New Roman" panose="02020603050405020304" pitchFamily="18" charset="0"/>
-                </a:endParaRPr>
               </a:p>
             </p:txBody>
           </p:sp>
         </mc:Choice>
-        <mc:Fallback>
+        <mc:Fallback xmlns="">
           <p:sp>
             <p:nvSpPr>
               <p:cNvPr id="4" name="TextBox 3"/>
@@ -10302,8 +10357,8 @@
             </p:nvSpPr>
             <p:spPr>
               <a:xfrm>
-                <a:off x="251520" y="4016422"/>
-                <a:ext cx="4259451" cy="1477328"/>
+                <a:off x="251520" y="3933056"/>
+                <a:ext cx="4259451" cy="2031325"/>
               </a:xfrm>
               <a:prstGeom prst="rect">
                 <a:avLst/>
@@ -10324,8 +10379,19 @@
                     <a:latin typeface="Times New Roman" panose="02020603050405020304" pitchFamily="18" charset="0"/>
                     <a:cs typeface="Times New Roman" panose="02020603050405020304" pitchFamily="18" charset="0"/>
                   </a:rPr>
-                  <a:t>Data from literatures shows enhancements of PF via band-alignment.</a:t>
-                </a:r>
+                  <a:t>Data from literatures shows enhancements of PF via </a:t>
+                </a:r>
+                <a:r>
+                  <a:rPr lang="en-US" dirty="0" smtClean="0">
+                    <a:latin typeface="Times New Roman" panose="02020603050405020304" pitchFamily="18" charset="0"/>
+                    <a:cs typeface="Times New Roman" panose="02020603050405020304" pitchFamily="18" charset="0"/>
+                  </a:rPr>
+                  <a:t>band-alignment, which can be achieved by controlled doping.</a:t>
+                </a:r>
+                <a:endParaRPr lang="en-US" dirty="0" smtClean="0">
+                  <a:latin typeface="Times New Roman" panose="02020603050405020304" pitchFamily="18" charset="0"/>
+                  <a:cs typeface="Times New Roman" panose="02020603050405020304" pitchFamily="18" charset="0"/>
+                </a:endParaRPr>
               </a:p>
               <a:p>
                 <a:pPr marL="285750" indent="-285750">
@@ -10451,8 +10517,8 @@
             </p:nvSpPr>
             <p:spPr>
               <a:xfrm>
-                <a:off x="251520" y="4016422"/>
-                <a:ext cx="4259451" cy="1477328"/>
+                <a:off x="251520" y="3933056"/>
+                <a:ext cx="4259451" cy="2031325"/>
               </a:xfrm>
               <a:prstGeom prst="rect">
                 <a:avLst/>
@@ -10460,7 +10526,7 @@
               <a:blipFill>
                 <a:blip r:embed="rId2"/>
                 <a:stretch>
-                  <a:fillRect l="-858" t="-2479" r="-572" b="-5785"/>
+                  <a:fillRect l="-858" t="-1502" r="-1431" b="-3904"/>
                 </a:stretch>
               </a:blipFill>
             </p:spPr>
@@ -10525,11 +10591,6 @@
               </a:rPr>
               <a:t>Analysis and Results</a:t>
             </a:r>
-            <a:endParaRPr lang="en-SG" dirty="0">
-              <a:solidFill>
-                <a:srgbClr val="FF0000"/>
-              </a:solidFill>
-            </a:endParaRPr>
           </a:p>
         </p:txBody>
       </p:sp>
@@ -10567,7 +10628,7 @@
             </p:nvSpPr>
             <p:spPr>
               <a:xfrm>
-                <a:off x="4654987" y="4016422"/>
+                <a:off x="4654987" y="3933056"/>
                 <a:ext cx="4349767" cy="2308324"/>
               </a:xfrm>
               <a:prstGeom prst="rect">
@@ -10705,8 +10766,19 @@
                     <a:latin typeface="Times New Roman" panose="02020603050405020304" pitchFamily="18" charset="0"/>
                     <a:cs typeface="Times New Roman" panose="02020603050405020304" pitchFamily="18" charset="0"/>
                   </a:rPr>
-                  <a:t> results in high PF)</a:t>
-                </a:r>
+                  <a:t> results in high PF</a:t>
+                </a:r>
+                <a:r>
+                  <a:rPr lang="en-US" dirty="0" smtClean="0">
+                    <a:latin typeface="Times New Roman" panose="02020603050405020304" pitchFamily="18" charset="0"/>
+                    <a:cs typeface="Times New Roman" panose="02020603050405020304" pitchFamily="18" charset="0"/>
+                  </a:rPr>
+                  <a:t>).</a:t>
+                </a:r>
+                <a:endParaRPr lang="en-US" dirty="0" smtClean="0">
+                  <a:latin typeface="Times New Roman" panose="02020603050405020304" pitchFamily="18" charset="0"/>
+                  <a:cs typeface="Times New Roman" panose="02020603050405020304" pitchFamily="18" charset="0"/>
+                </a:endParaRPr>
               </a:p>
               <a:p>
                 <a:pPr marL="285750" indent="-285750">
@@ -10732,7 +10804,21 @@
                     <a:latin typeface="Times New Roman" panose="02020603050405020304" pitchFamily="18" charset="0"/>
                     <a:cs typeface="Times New Roman" panose="02020603050405020304" pitchFamily="18" charset="0"/>
                   </a:rPr>
-                  <a:t>,  as well as promising </a:t>
+                  <a:t>, </a:t>
+                </a:r>
+                <a:r>
+                  <a:rPr lang="en-US" dirty="0" smtClean="0">
+                    <a:latin typeface="Times New Roman" panose="02020603050405020304" pitchFamily="18" charset="0"/>
+                    <a:cs typeface="Times New Roman" panose="02020603050405020304" pitchFamily="18" charset="0"/>
+                  </a:rPr>
+                  <a:t>as </a:t>
+                </a:r>
+                <a:r>
+                  <a:rPr lang="en-US" dirty="0" smtClean="0">
+                    <a:latin typeface="Times New Roman" panose="02020603050405020304" pitchFamily="18" charset="0"/>
+                    <a:cs typeface="Times New Roman" panose="02020603050405020304" pitchFamily="18" charset="0"/>
+                  </a:rPr>
+                  <a:t>well as promising </a:t>
                 </a:r>
                 <a:r>
                   <a:rPr lang="en-US" dirty="0">
@@ -10755,7 +10841,10 @@
                   <a:buChar char="-"/>
                 </a:pPr>
                 <a:r>
-                  <a:rPr lang="en-US" dirty="0"/>
+                  <a:rPr lang="en-US" dirty="0">
+                    <a:latin typeface="Times New Roman" panose="02020603050405020304" pitchFamily="18" charset="0"/>
+                    <a:cs typeface="Times New Roman" panose="02020603050405020304" pitchFamily="18" charset="0"/>
+                  </a:rPr>
                   <a:t>Most good TE materials have </a:t>
                 </a:r>
                 <a14:m>
@@ -10800,18 +10889,30 @@
                   </m:oMath>
                 </a14:m>
                 <a:r>
-                  <a:rPr lang="en-US" dirty="0"/>
+                  <a:rPr lang="en-US" dirty="0">
+                    <a:latin typeface="Times New Roman" panose="02020603050405020304" pitchFamily="18" charset="0"/>
+                    <a:cs typeface="Times New Roman" panose="02020603050405020304" pitchFamily="18" charset="0"/>
+                  </a:rPr>
                   <a:t> below 1.0 </a:t>
                 </a:r>
                 <a:r>
-                  <a:rPr lang="en-US" dirty="0" smtClean="0"/>
+                  <a:rPr lang="en-US" dirty="0" smtClean="0">
+                    <a:latin typeface="Times New Roman" panose="02020603050405020304" pitchFamily="18" charset="0"/>
+                    <a:cs typeface="Times New Roman" panose="02020603050405020304" pitchFamily="18" charset="0"/>
+                  </a:rPr>
                   <a:t>m</a:t>
                 </a:r>
                 <a:r>
-                  <a:rPr lang="en-US" baseline="-25000" dirty="0" smtClean="0"/>
+                  <a:rPr lang="en-US" baseline="-25000" dirty="0" smtClean="0">
+                    <a:latin typeface="Times New Roman" panose="02020603050405020304" pitchFamily="18" charset="0"/>
+                    <a:cs typeface="Times New Roman" panose="02020603050405020304" pitchFamily="18" charset="0"/>
+                  </a:rPr>
                   <a:t>e</a:t>
                 </a:r>
-                <a:endParaRPr lang="en-US" baseline="-25000" dirty="0"/>
+                <a:endParaRPr lang="en-US" baseline="-25000" dirty="0">
+                  <a:latin typeface="Times New Roman" panose="02020603050405020304" pitchFamily="18" charset="0"/>
+                  <a:cs typeface="Times New Roman" panose="02020603050405020304" pitchFamily="18" charset="0"/>
+                </a:endParaRPr>
               </a:p>
             </p:txBody>
           </p:sp>
@@ -10827,7 +10928,7 @@
             </p:nvSpPr>
             <p:spPr>
               <a:xfrm>
-                <a:off x="4654987" y="4016422"/>
+                <a:off x="4654987" y="3933056"/>
                 <a:ext cx="4349767" cy="2308324"/>
               </a:xfrm>
               <a:prstGeom prst="rect">
@@ -10836,7 +10937,7 @@
               <a:blipFill>
                 <a:blip r:embed="rId4"/>
                 <a:stretch>
-                  <a:fillRect l="-1262" t="-1583" b="-3166"/>
+                  <a:fillRect l="-982" t="-1319" b="-3166"/>
                 </a:stretch>
               </a:blipFill>
             </p:spPr>
@@ -10976,8 +11077,8 @@
           <a:chExt cx="0" cy="0"/>
         </a:xfrm>
       </p:grpSpPr>
-      <mc:AlternateContent xmlns:mc="http://schemas.openxmlformats.org/markup-compatibility/2006">
-        <mc:Choice xmlns:a14="http://schemas.microsoft.com/office/drawing/2010/main" Requires="a14">
+      <mc:AlternateContent xmlns:mc="http://schemas.openxmlformats.org/markup-compatibility/2006" xmlns:a14="http://schemas.microsoft.com/office/drawing/2010/main">
+        <mc:Choice Requires="a14">
           <p:sp>
             <p:nvSpPr>
               <p:cNvPr id="5" name="TextBox 4"/>
@@ -11314,42 +11415,7 @@
                     <a:latin typeface="Times New Roman" panose="02020603050405020304" pitchFamily="18" charset="0"/>
                     <a:cs typeface="Times New Roman" panose="02020603050405020304" pitchFamily="18" charset="0"/>
                   </a:rPr>
-                  <a:t> coefficient (</a:t>
-                </a:r>
-                <a:r>
-                  <a:rPr lang="en-US" sz="2000" dirty="0" smtClean="0">
-                    <a:latin typeface="Times New Roman" panose="02020603050405020304" pitchFamily="18" charset="0"/>
-                    <a:cs typeface="Times New Roman" panose="02020603050405020304" pitchFamily="18" charset="0"/>
-                  </a:rPr>
-                  <a:t>Fig 3 and 5</a:t>
-                </a:r>
-                <a:r>
-                  <a:rPr lang="en-US" sz="2000" dirty="0" smtClean="0">
-                    <a:latin typeface="Times New Roman" panose="02020603050405020304" pitchFamily="18" charset="0"/>
-                    <a:cs typeface="Times New Roman" panose="02020603050405020304" pitchFamily="18" charset="0"/>
-                  </a:rPr>
-                  <a:t>), and tend to have higher </a:t>
-                </a:r>
-                <a:r>
-                  <a:rPr lang="en-US" sz="2000" dirty="0" smtClean="0">
-                    <a:latin typeface="Times New Roman" panose="02020603050405020304" pitchFamily="18" charset="0"/>
-                    <a:cs typeface="Times New Roman" panose="02020603050405020304" pitchFamily="18" charset="0"/>
-                  </a:rPr>
-                  <a:t>starting PF </a:t>
-                </a:r>
-                <a:r>
-                  <a:rPr lang="en-US" sz="2000" dirty="0" smtClean="0">
-                    <a:latin typeface="Times New Roman" panose="02020603050405020304" pitchFamily="18" charset="0"/>
-                    <a:cs typeface="Times New Roman" panose="02020603050405020304" pitchFamily="18" charset="0"/>
-                  </a:rPr>
-                  <a:t>(Fig 1</a:t>
-                </a:r>
-                <a:r>
-                  <a:rPr lang="en-US" sz="2000" dirty="0" smtClean="0">
-                    <a:latin typeface="Times New Roman" panose="02020603050405020304" pitchFamily="18" charset="0"/>
-                    <a:cs typeface="Times New Roman" panose="02020603050405020304" pitchFamily="18" charset="0"/>
-                  </a:rPr>
-                  <a:t>);</a:t>
+                  <a:t> coefficient (Fig 3 and 5), and tend to have higher starting PF (Fig 1);</a:t>
                 </a:r>
                 <a:endParaRPr lang="en-US" sz="2000" dirty="0">
                   <a:latin typeface="Times New Roman" panose="02020603050405020304" pitchFamily="18" charset="0"/>
@@ -11632,7 +11698,7 @@
             </p:txBody>
           </p:sp>
         </mc:Choice>
-        <mc:Fallback>
+        <mc:Fallback xmlns="">
           <p:sp>
             <p:nvSpPr>
               <p:cNvPr id="5" name="TextBox 4"/>
@@ -12758,6 +12824,45 @@
 </file>
 
 <file path=customXml/item2.xml><?xml version="1.0" encoding="utf-8"?>
+<p:properties xmlns:p="http://schemas.microsoft.com/office/2006/metadata/properties" xmlns:xsi="http://www.w3.org/2001/XMLSchema-instance" xmlns:pc="http://schemas.microsoft.com/office/infopath/2007/PartnerControls">
+  <documentManagement/>
+</p:properties>
+</file>
+
+<file path=customXml/item3.xml><?xml version="1.0" encoding="utf-8"?>
+<?mso-contentType ?>
+<FormTemplates xmlns="http://schemas.microsoft.com/sharepoint/v3/contenttype/forms">
+  <Display>DocumentLibraryForm</Display>
+  <Edit>DocumentLibraryForm</Edit>
+  <New>DocumentLibraryForm</New>
+</FormTemplates>
+</file>
+
+<file path=customXml/item4.xml><?xml version="1.0" encoding="utf-8"?>
+<?mso-contentType ?>
+<p:Policy xmlns:p="office.server.policy" id="" local="true">
+  <p:Name>Document</p:Name>
+  <p:Description/>
+  <p:Statement/>
+  <p:PolicyItems>
+    <p:PolicyItem featureId="Microsoft.Office.RecordsManagement.PolicyFeatures.PolicyAudit" staticId="0x0101|8138272" UniqueId="006dbbcb-91d2-4f80-a72f-5fe2f7fed88e">
+      <p:Name>Auditing</p:Name>
+      <p:Description>Audits user actions on documents and list items to the Audit Log.</p:Description>
+      <p:CustomData>
+        <Audit>
+          <Update/>
+          <View/>
+          <CheckInOut/>
+          <MoveCopy/>
+          <DeleteRestore/>
+        </Audit>
+      </p:CustomData>
+    </p:PolicyItem>
+  </p:PolicyItems>
+</p:Policy>
+</file>
+
+<file path=customXml/item5.xml><?xml version="1.0" encoding="utf-8"?>
 <?mso-contentType ?>
 <spe:Receivers xmlns:spe="http://schemas.microsoft.com/sharepoint/events">
   <Receiver>
@@ -12803,45 +12908,6 @@
 </spe:Receivers>
 </file>
 
-<file path=customXml/item3.xml><?xml version="1.0" encoding="utf-8"?>
-<?mso-contentType ?>
-<p:Policy xmlns:p="office.server.policy" id="" local="true">
-  <p:Name>Document</p:Name>
-  <p:Description/>
-  <p:Statement/>
-  <p:PolicyItems>
-    <p:PolicyItem featureId="Microsoft.Office.RecordsManagement.PolicyFeatures.PolicyAudit" staticId="0x0101|8138272" UniqueId="006dbbcb-91d2-4f80-a72f-5fe2f7fed88e">
-      <p:Name>Auditing</p:Name>
-      <p:Description>Audits user actions on documents and list items to the Audit Log.</p:Description>
-      <p:CustomData>
-        <Audit>
-          <Update/>
-          <View/>
-          <CheckInOut/>
-          <MoveCopy/>
-          <DeleteRestore/>
-        </Audit>
-      </p:CustomData>
-    </p:PolicyItem>
-  </p:PolicyItems>
-</p:Policy>
-</file>
-
-<file path=customXml/item4.xml><?xml version="1.0" encoding="utf-8"?>
-<?mso-contentType ?>
-<FormTemplates xmlns="http://schemas.microsoft.com/sharepoint/v3/contenttype/forms">
-  <Display>DocumentLibraryForm</Display>
-  <Edit>DocumentLibraryForm</Edit>
-  <New>DocumentLibraryForm</New>
-</FormTemplates>
-</file>
-
-<file path=customXml/item5.xml><?xml version="1.0" encoding="utf-8"?>
-<p:properties xmlns:p="http://schemas.microsoft.com/office/2006/metadata/properties" xmlns:xsi="http://www.w3.org/2001/XMLSchema-instance" xmlns:pc="http://schemas.microsoft.com/office/infopath/2007/PartnerControls">
-  <documentManagement/>
-</p:properties>
-</file>
-
 <file path=customXml/itemProps1.xml><?xml version="1.0" encoding="utf-8"?>
 <ds:datastoreItem xmlns:ds="http://schemas.openxmlformats.org/officeDocument/2006/customXml" ds:itemID="{8DDAA6B6-5642-4C73-B896-3C7E4676CA3F}">
   <ds:schemaRefs>
@@ -12861,14 +12927,30 @@
 </file>
 
 <file path=customXml/itemProps2.xml><?xml version="1.0" encoding="utf-8"?>
-<ds:datastoreItem xmlns:ds="http://schemas.openxmlformats.org/officeDocument/2006/customXml" ds:itemID="{44F2D175-2A86-4DB5-9BE3-648780563B6D}">
+<ds:datastoreItem xmlns:ds="http://schemas.openxmlformats.org/officeDocument/2006/customXml" ds:itemID="{E3B805FC-04D1-4394-8DD4-577A85FE1356}">
   <ds:schemaRefs>
-    <ds:schemaRef ds:uri="http://schemas.microsoft.com/sharepoint/events"/>
+    <ds:schemaRef ds:uri="http://purl.org/dc/terms/"/>
+    <ds:schemaRef ds:uri="http://www.w3.org/XML/1998/namespace"/>
+    <ds:schemaRef ds:uri="http://purl.org/dc/elements/1.1/"/>
+    <ds:schemaRef ds:uri="http://schemas.microsoft.com/office/2006/metadata/properties"/>
+    <ds:schemaRef ds:uri="http://schemas.microsoft.com/office/2006/documentManagement/types"/>
+    <ds:schemaRef ds:uri="http://schemas.microsoft.com/office/infopath/2007/PartnerControls"/>
+    <ds:schemaRef ds:uri="http://schemas.openxmlformats.org/package/2006/metadata/core-properties"/>
+    <ds:schemaRef ds:uri="http://schemas.microsoft.com/sharepoint/v3"/>
+    <ds:schemaRef ds:uri="http://purl.org/dc/dcmitype/"/>
   </ds:schemaRefs>
 </ds:datastoreItem>
 </file>
 
 <file path=customXml/itemProps3.xml><?xml version="1.0" encoding="utf-8"?>
+<ds:datastoreItem xmlns:ds="http://schemas.openxmlformats.org/officeDocument/2006/customXml" ds:itemID="{3E693C3E-4794-4CBB-B48A-9F1ECC1DA3FE}">
+  <ds:schemaRefs>
+    <ds:schemaRef ds:uri="http://schemas.microsoft.com/sharepoint/v3/contenttype/forms"/>
+  </ds:schemaRefs>
+</ds:datastoreItem>
+</file>
+
+<file path=customXml/itemProps4.xml><?xml version="1.0" encoding="utf-8"?>
 <ds:datastoreItem xmlns:ds="http://schemas.openxmlformats.org/officeDocument/2006/customXml" ds:itemID="{EB52C14F-04CC-459F-9465-AD7B786FE9E0}">
   <ds:schemaRefs>
     <ds:schemaRef ds:uri="office.server.policy"/>
@@ -12876,26 +12958,10 @@
 </ds:datastoreItem>
 </file>
 
-<file path=customXml/itemProps4.xml><?xml version="1.0" encoding="utf-8"?>
-<ds:datastoreItem xmlns:ds="http://schemas.openxmlformats.org/officeDocument/2006/customXml" ds:itemID="{3E693C3E-4794-4CBB-B48A-9F1ECC1DA3FE}">
+<file path=customXml/itemProps5.xml><?xml version="1.0" encoding="utf-8"?>
+<ds:datastoreItem xmlns:ds="http://schemas.openxmlformats.org/officeDocument/2006/customXml" ds:itemID="{44F2D175-2A86-4DB5-9BE3-648780563B6D}">
   <ds:schemaRefs>
-    <ds:schemaRef ds:uri="http://schemas.microsoft.com/sharepoint/v3/contenttype/forms"/>
-  </ds:schemaRefs>
-</ds:datastoreItem>
-</file>
-
-<file path=customXml/itemProps5.xml><?xml version="1.0" encoding="utf-8"?>
-<ds:datastoreItem xmlns:ds="http://schemas.openxmlformats.org/officeDocument/2006/customXml" ds:itemID="{E3B805FC-04D1-4394-8DD4-577A85FE1356}">
-  <ds:schemaRefs>
-    <ds:schemaRef ds:uri="http://purl.org/dc/terms/"/>
-    <ds:schemaRef ds:uri="http://schemas.microsoft.com/office/2006/documentManagement/types"/>
-    <ds:schemaRef ds:uri="http://schemas.microsoft.com/office/2006/metadata/properties"/>
-    <ds:schemaRef ds:uri="http://www.w3.org/XML/1998/namespace"/>
-    <ds:schemaRef ds:uri="http://schemas.microsoft.com/sharepoint/v3"/>
-    <ds:schemaRef ds:uri="http://purl.org/dc/dcmitype/"/>
-    <ds:schemaRef ds:uri="http://schemas.openxmlformats.org/package/2006/metadata/core-properties"/>
-    <ds:schemaRef ds:uri="http://schemas.microsoft.com/office/infopath/2007/PartnerControls"/>
-    <ds:schemaRef ds:uri="http://purl.org/dc/elements/1.1/"/>
+    <ds:schemaRef ds:uri="http://schemas.microsoft.com/sharepoint/events"/>
   </ds:schemaRefs>
 </ds:datastoreItem>
 </file>
</xml_diff>